<commit_message>
Added the ER diagram to presentation
</commit_message>
<xml_diff>
--- a/project_documentation/CPSC 471 - Group 2 presentation.pptx
+++ b/project_documentation/CPSC 471 - Group 2 presentation.pptx
@@ -5,10 +5,10 @@
     <p:sldMasterId id="2147483648" r:id="rId1"/>
   </p:sldMasterIdLst>
   <p:notesMasterIdLst>
-    <p:notesMasterId r:id="rId12"/>
+    <p:notesMasterId r:id="rId13"/>
   </p:notesMasterIdLst>
   <p:handoutMasterIdLst>
-    <p:handoutMasterId r:id="rId13"/>
+    <p:handoutMasterId r:id="rId14"/>
   </p:handoutMasterIdLst>
   <p:sldIdLst>
     <p:sldId id="256" r:id="rId2"/>
@@ -18,9 +18,10 @@
     <p:sldId id="277" r:id="rId6"/>
     <p:sldId id="278" r:id="rId7"/>
     <p:sldId id="284" r:id="rId8"/>
-    <p:sldId id="281" r:id="rId9"/>
-    <p:sldId id="280" r:id="rId10"/>
-    <p:sldId id="283" r:id="rId11"/>
+    <p:sldId id="285" r:id="rId9"/>
+    <p:sldId id="281" r:id="rId10"/>
+    <p:sldId id="280" r:id="rId11"/>
+    <p:sldId id="283" r:id="rId12"/>
   </p:sldIdLst>
   <p:sldSz cx="12188825" cy="6858000"/>
   <p:notesSz cx="6858000" cy="9144000"/>
@@ -150,6 +151,10 @@
     </p:ext>
   </p:extLst>
 </p:presentation>
+</file>
+
+<file path=ppt/revisionInfo.xml><?xml version="1.0" encoding="utf-8"?>
+<p1510:revInfo xmlns:a="http://schemas.openxmlformats.org/drawingml/2006/main" xmlns:r="http://schemas.openxmlformats.org/officeDocument/2006/relationships" xmlns:p1510="http://schemas.microsoft.com/office/powerpoint/2015/10/main"/>
 </file>
 
 <file path=ppt/handoutMasters/handoutMaster1.xml><?xml version="1.0" encoding="utf-8"?>
@@ -4320,6 +4325,272 @@
             <a:pPr algn="ctr"/>
             <a:r>
               <a:rPr lang="en-US" sz="6600" b="1" dirty="0"/>
+              <a:t>Questions?</a:t>
+            </a:r>
+          </a:p>
+        </p:txBody>
+      </p:sp>
+      <p:sp>
+        <p:nvSpPr>
+          <p:cNvPr id="14" name="Content Placeholder 13"/>
+          <p:cNvSpPr>
+            <a:spLocks noGrp="1"/>
+          </p:cNvSpPr>
+          <p:nvPr>
+            <p:ph idx="1"/>
+          </p:nvPr>
+        </p:nvSpPr>
+        <p:spPr>
+          <a:xfrm>
+            <a:off x="1293813" y="685800"/>
+            <a:ext cx="4872607" cy="4190999"/>
+          </a:xfrm>
+        </p:spPr>
+        <p:txBody>
+          <a:bodyPr>
+            <a:normAutofit/>
+          </a:bodyPr>
+          <a:lstStyle/>
+          <a:p>
+            <a:pPr marL="0" indent="0" algn="just">
+              <a:buNone/>
+            </a:pPr>
+            <a:endParaRPr lang="en-CA" dirty="0"/>
+          </a:p>
+          <a:p>
+            <a:pPr algn="just">
+              <a:buFont typeface="Wingdings" panose="05000000000000000000" pitchFamily="2" charset="2"/>
+              <a:buChar char="q"/>
+            </a:pPr>
+            <a:endParaRPr lang="en-CA" dirty="0"/>
+          </a:p>
+        </p:txBody>
+      </p:sp>
+    </p:spTree>
+    <p:extLst>
+      <p:ext uri="{BB962C8B-B14F-4D97-AF65-F5344CB8AC3E}">
+        <p14:creationId xmlns:p14="http://schemas.microsoft.com/office/powerpoint/2010/main" val="302370877"/>
+      </p:ext>
+    </p:extLst>
+  </p:cSld>
+  <p:clrMapOvr>
+    <a:masterClrMapping/>
+  </p:clrMapOvr>
+  <mc:AlternateContent xmlns:mc="http://schemas.openxmlformats.org/markup-compatibility/2006" xmlns:p14="http://schemas.microsoft.com/office/powerpoint/2010/main">
+    <mc:Choice Requires="p14">
+      <p:transition spd="med" p14:dur="700">
+        <p:fade/>
+      </p:transition>
+    </mc:Choice>
+    <mc:Fallback xmlns="">
+      <p:transition spd="med">
+        <p:fade/>
+      </p:transition>
+    </mc:Fallback>
+  </mc:AlternateContent>
+  <p:timing>
+    <p:tnLst>
+      <p:par>
+        <p:cTn id="1" dur="indefinite" restart="never" nodeType="tmRoot">
+          <p:childTnLst>
+            <p:seq concurrent="1" nextAc="seek">
+              <p:cTn id="2" dur="indefinite" nodeType="mainSeq">
+                <p:childTnLst>
+                  <p:par>
+                    <p:cTn id="3" fill="hold">
+                      <p:stCondLst>
+                        <p:cond delay="indefinite"/>
+                        <p:cond evt="onBegin" delay="0">
+                          <p:tn val="2"/>
+                        </p:cond>
+                      </p:stCondLst>
+                      <p:childTnLst>
+                        <p:par>
+                          <p:cTn id="4" fill="hold">
+                            <p:stCondLst>
+                              <p:cond delay="0"/>
+                            </p:stCondLst>
+                            <p:childTnLst>
+                              <p:par>
+                                <p:cTn id="5" presetID="31" presetClass="entr" presetSubtype="0" fill="hold" grpId="0" nodeType="afterEffect">
+                                  <p:stCondLst>
+                                    <p:cond delay="0"/>
+                                  </p:stCondLst>
+                                  <p:childTnLst>
+                                    <p:set>
+                                      <p:cBhvr>
+                                        <p:cTn id="6" dur="1" fill="hold">
+                                          <p:stCondLst>
+                                            <p:cond delay="0"/>
+                                          </p:stCondLst>
+                                        </p:cTn>
+                                        <p:tgtEl>
+                                          <p:spTgt spid="13"/>
+                                        </p:tgtEl>
+                                        <p:attrNameLst>
+                                          <p:attrName>style.visibility</p:attrName>
+                                        </p:attrNameLst>
+                                      </p:cBhvr>
+                                      <p:to>
+                                        <p:strVal val="visible"/>
+                                      </p:to>
+                                    </p:set>
+                                    <p:anim calcmode="lin" valueType="num">
+                                      <p:cBhvr>
+                                        <p:cTn id="7" dur="1000" fill="hold"/>
+                                        <p:tgtEl>
+                                          <p:spTgt spid="13"/>
+                                        </p:tgtEl>
+                                        <p:attrNameLst>
+                                          <p:attrName>ppt_w</p:attrName>
+                                        </p:attrNameLst>
+                                      </p:cBhvr>
+                                      <p:tavLst>
+                                        <p:tav tm="0">
+                                          <p:val>
+                                            <p:fltVal val="0"/>
+                                          </p:val>
+                                        </p:tav>
+                                        <p:tav tm="100000">
+                                          <p:val>
+                                            <p:strVal val="#ppt_w"/>
+                                          </p:val>
+                                        </p:tav>
+                                      </p:tavLst>
+                                    </p:anim>
+                                    <p:anim calcmode="lin" valueType="num">
+                                      <p:cBhvr>
+                                        <p:cTn id="8" dur="1000" fill="hold"/>
+                                        <p:tgtEl>
+                                          <p:spTgt spid="13"/>
+                                        </p:tgtEl>
+                                        <p:attrNameLst>
+                                          <p:attrName>ppt_h</p:attrName>
+                                        </p:attrNameLst>
+                                      </p:cBhvr>
+                                      <p:tavLst>
+                                        <p:tav tm="0">
+                                          <p:val>
+                                            <p:fltVal val="0"/>
+                                          </p:val>
+                                        </p:tav>
+                                        <p:tav tm="100000">
+                                          <p:val>
+                                            <p:strVal val="#ppt_h"/>
+                                          </p:val>
+                                        </p:tav>
+                                      </p:tavLst>
+                                    </p:anim>
+                                    <p:anim calcmode="lin" valueType="num">
+                                      <p:cBhvr>
+                                        <p:cTn id="9" dur="1000" fill="hold"/>
+                                        <p:tgtEl>
+                                          <p:spTgt spid="13"/>
+                                        </p:tgtEl>
+                                        <p:attrNameLst>
+                                          <p:attrName>style.rotation</p:attrName>
+                                        </p:attrNameLst>
+                                      </p:cBhvr>
+                                      <p:tavLst>
+                                        <p:tav tm="0">
+                                          <p:val>
+                                            <p:fltVal val="90"/>
+                                          </p:val>
+                                        </p:tav>
+                                        <p:tav tm="100000">
+                                          <p:val>
+                                            <p:fltVal val="0"/>
+                                          </p:val>
+                                        </p:tav>
+                                      </p:tavLst>
+                                    </p:anim>
+                                    <p:animEffect transition="in" filter="fade">
+                                      <p:cBhvr>
+                                        <p:cTn id="10" dur="1000"/>
+                                        <p:tgtEl>
+                                          <p:spTgt spid="13"/>
+                                        </p:tgtEl>
+                                      </p:cBhvr>
+                                    </p:animEffect>
+                                  </p:childTnLst>
+                                </p:cTn>
+                              </p:par>
+                            </p:childTnLst>
+                          </p:cTn>
+                        </p:par>
+                      </p:childTnLst>
+                    </p:cTn>
+                  </p:par>
+                </p:childTnLst>
+              </p:cTn>
+              <p:prevCondLst>
+                <p:cond evt="onPrev" delay="0">
+                  <p:tgtEl>
+                    <p:sldTgt/>
+                  </p:tgtEl>
+                </p:cond>
+              </p:prevCondLst>
+              <p:nextCondLst>
+                <p:cond evt="onNext" delay="0">
+                  <p:tgtEl>
+                    <p:sldTgt/>
+                  </p:tgtEl>
+                </p:cond>
+              </p:nextCondLst>
+            </p:seq>
+          </p:childTnLst>
+        </p:cTn>
+      </p:par>
+    </p:tnLst>
+    <p:bldLst>
+      <p:bldP spid="13" grpId="0"/>
+    </p:bldLst>
+  </p:timing>
+</p:sld>
+</file>
+
+<file path=ppt/slides/slide11.xml><?xml version="1.0" encoding="utf-8"?>
+<p:sld xmlns:a="http://schemas.openxmlformats.org/drawingml/2006/main" xmlns:r="http://schemas.openxmlformats.org/officeDocument/2006/relationships" xmlns:p="http://schemas.openxmlformats.org/presentationml/2006/main">
+  <p:cSld>
+    <p:spTree>
+      <p:nvGrpSpPr>
+        <p:cNvPr id="1" name=""/>
+        <p:cNvGrpSpPr/>
+        <p:nvPr/>
+      </p:nvGrpSpPr>
+      <p:grpSpPr>
+        <a:xfrm>
+          <a:off x="0" y="0"/>
+          <a:ext cx="0" cy="0"/>
+          <a:chOff x="0" y="0"/>
+          <a:chExt cx="0" cy="0"/>
+        </a:xfrm>
+      </p:grpSpPr>
+      <p:sp>
+        <p:nvSpPr>
+          <p:cNvPr id="13" name="Title 12"/>
+          <p:cNvSpPr>
+            <a:spLocks noGrp="1"/>
+          </p:cNvSpPr>
+          <p:nvPr>
+            <p:ph type="title"/>
+          </p:nvPr>
+        </p:nvSpPr>
+        <p:spPr>
+          <a:xfrm>
+            <a:off x="680734" y="2777648"/>
+            <a:ext cx="10971372" cy="1066800"/>
+          </a:xfrm>
+        </p:spPr>
+        <p:txBody>
+          <a:bodyPr>
+            <a:normAutofit/>
+          </a:bodyPr>
+          <a:lstStyle/>
+          <a:p>
+            <a:pPr algn="ctr"/>
+            <a:r>
+              <a:rPr lang="en-US" sz="6600" b="1" dirty="0"/>
               <a:t>Thank you!</a:t>
             </a:r>
           </a:p>
@@ -7236,7 +7507,12 @@
             <p:ph type="title"/>
           </p:nvPr>
         </p:nvSpPr>
-        <p:spPr/>
+        <p:spPr>
+          <a:xfrm>
+            <a:off x="549796" y="5661248"/>
+            <a:ext cx="10971372" cy="1066800"/>
+          </a:xfrm>
+        </p:spPr>
         <p:txBody>
           <a:bodyPr/>
           <a:lstStyle/>
@@ -7285,6 +7561,36 @@
           </a:p>
         </p:txBody>
       </p:sp>
+      <p:pic>
+        <p:nvPicPr>
+          <p:cNvPr id="2" name="Picture 1">
+            <a:extLst>
+              <a:ext uri="{FF2B5EF4-FFF2-40B4-BE49-F238E27FC236}">
+                <a16:creationId xmlns:a16="http://schemas.microsoft.com/office/drawing/2014/main" id="{569AAF53-5D40-4C00-AE75-476319132556}"/>
+              </a:ext>
+            </a:extLst>
+          </p:cNvPr>
+          <p:cNvPicPr>
+            <a:picLocks noChangeAspect="1"/>
+          </p:cNvPicPr>
+          <p:nvPr/>
+        </p:nvPicPr>
+        <p:blipFill>
+          <a:blip r:embed="rId2"/>
+          <a:stretch>
+            <a:fillRect/>
+          </a:stretch>
+        </p:blipFill>
+        <p:spPr>
+          <a:xfrm>
+            <a:off x="549796" y="260648"/>
+            <a:ext cx="11161240" cy="5904656"/>
+          </a:xfrm>
+          <a:prstGeom prst="rect">
+            <a:avLst/>
+          </a:prstGeom>
+        </p:spPr>
+      </p:pic>
     </p:spTree>
     <p:extLst>
       <p:ext uri="{BB962C8B-B14F-4D97-AF65-F5344CB8AC3E}">
@@ -7307,10 +7613,318 @@
       </p:transition>
     </mc:Fallback>
   </mc:AlternateContent>
+  <p:timing>
+    <p:tnLst>
+      <p:par>
+        <p:cTn id="1" dur="indefinite" restart="never" nodeType="tmRoot">
+          <p:childTnLst>
+            <p:seq concurrent="1" nextAc="seek">
+              <p:cTn id="2" dur="indefinite" nodeType="mainSeq">
+                <p:childTnLst>
+                  <p:par>
+                    <p:cTn id="3" fill="hold">
+                      <p:stCondLst>
+                        <p:cond delay="indefinite"/>
+                        <p:cond evt="onBegin" delay="0">
+                          <p:tn val="2"/>
+                        </p:cond>
+                      </p:stCondLst>
+                      <p:childTnLst>
+                        <p:par>
+                          <p:cTn id="4" fill="hold">
+                            <p:stCondLst>
+                              <p:cond delay="0"/>
+                            </p:stCondLst>
+                            <p:childTnLst>
+                              <p:par>
+                                <p:cTn id="5" presetID="6" presetClass="entr" presetSubtype="16" fill="hold" nodeType="afterEffect">
+                                  <p:stCondLst>
+                                    <p:cond delay="0"/>
+                                  </p:stCondLst>
+                                  <p:childTnLst>
+                                    <p:set>
+                                      <p:cBhvr>
+                                        <p:cTn id="6" dur="1" fill="hold">
+                                          <p:stCondLst>
+                                            <p:cond delay="0"/>
+                                          </p:stCondLst>
+                                        </p:cTn>
+                                        <p:tgtEl>
+                                          <p:spTgt spid="2"/>
+                                        </p:tgtEl>
+                                        <p:attrNameLst>
+                                          <p:attrName>style.visibility</p:attrName>
+                                        </p:attrNameLst>
+                                      </p:cBhvr>
+                                      <p:to>
+                                        <p:strVal val="visible"/>
+                                      </p:to>
+                                    </p:set>
+                                    <p:animEffect transition="in" filter="circle(in)">
+                                      <p:cBhvr>
+                                        <p:cTn id="7" dur="2000"/>
+                                        <p:tgtEl>
+                                          <p:spTgt spid="2"/>
+                                        </p:tgtEl>
+                                      </p:cBhvr>
+                                    </p:animEffect>
+                                  </p:childTnLst>
+                                </p:cTn>
+                              </p:par>
+                            </p:childTnLst>
+                          </p:cTn>
+                        </p:par>
+                      </p:childTnLst>
+                    </p:cTn>
+                  </p:par>
+                </p:childTnLst>
+              </p:cTn>
+              <p:prevCondLst>
+                <p:cond evt="onPrev" delay="0">
+                  <p:tgtEl>
+                    <p:sldTgt/>
+                  </p:tgtEl>
+                </p:cond>
+              </p:prevCondLst>
+              <p:nextCondLst>
+                <p:cond evt="onNext" delay="0">
+                  <p:tgtEl>
+                    <p:sldTgt/>
+                  </p:tgtEl>
+                </p:cond>
+              </p:nextCondLst>
+            </p:seq>
+          </p:childTnLst>
+        </p:cTn>
+      </p:par>
+    </p:tnLst>
+  </p:timing>
 </p:sld>
 </file>
 
 <file path=ppt/slides/slide8.xml><?xml version="1.0" encoding="utf-8"?>
+<p:sld xmlns:a="http://schemas.openxmlformats.org/drawingml/2006/main" xmlns:r="http://schemas.openxmlformats.org/officeDocument/2006/relationships" xmlns:p="http://schemas.openxmlformats.org/presentationml/2006/main">
+  <p:cSld>
+    <p:spTree>
+      <p:nvGrpSpPr>
+        <p:cNvPr id="1" name=""/>
+        <p:cNvGrpSpPr/>
+        <p:nvPr/>
+      </p:nvGrpSpPr>
+      <p:grpSpPr>
+        <a:xfrm>
+          <a:off x="0" y="0"/>
+          <a:ext cx="0" cy="0"/>
+          <a:chOff x="0" y="0"/>
+          <a:chExt cx="0" cy="0"/>
+        </a:xfrm>
+      </p:grpSpPr>
+      <p:sp>
+        <p:nvSpPr>
+          <p:cNvPr id="13" name="Title 12"/>
+          <p:cNvSpPr>
+            <a:spLocks noGrp="1"/>
+          </p:cNvSpPr>
+          <p:nvPr>
+            <p:ph type="title"/>
+          </p:nvPr>
+        </p:nvSpPr>
+        <p:spPr>
+          <a:xfrm>
+            <a:off x="549796" y="5661248"/>
+            <a:ext cx="10971372" cy="1066800"/>
+          </a:xfrm>
+        </p:spPr>
+        <p:txBody>
+          <a:bodyPr/>
+          <a:lstStyle/>
+          <a:p>
+            <a:r>
+              <a:rPr lang="en-CA" b="1" dirty="0"/>
+              <a:t>The ER model?</a:t>
+            </a:r>
+            <a:endParaRPr lang="en-US" b="1" dirty="0"/>
+          </a:p>
+        </p:txBody>
+      </p:sp>
+      <p:sp>
+        <p:nvSpPr>
+          <p:cNvPr id="14" name="Content Placeholder 13"/>
+          <p:cNvSpPr>
+            <a:spLocks noGrp="1"/>
+          </p:cNvSpPr>
+          <p:nvPr>
+            <p:ph idx="1"/>
+          </p:nvPr>
+        </p:nvSpPr>
+        <p:spPr>
+          <a:xfrm>
+            <a:off x="1293813" y="685800"/>
+            <a:ext cx="9841159" cy="4190999"/>
+          </a:xfrm>
+        </p:spPr>
+        <p:txBody>
+          <a:bodyPr>
+            <a:normAutofit/>
+          </a:bodyPr>
+          <a:lstStyle/>
+          <a:p>
+            <a:pPr marL="0" indent="0" algn="just">
+              <a:buNone/>
+            </a:pPr>
+            <a:endParaRPr lang="en-CA" dirty="0"/>
+          </a:p>
+          <a:p>
+            <a:pPr algn="just">
+              <a:buFont typeface="Wingdings" panose="05000000000000000000" pitchFamily="2" charset="2"/>
+              <a:buChar char="q"/>
+            </a:pPr>
+            <a:endParaRPr lang="en-CA" dirty="0"/>
+          </a:p>
+        </p:txBody>
+      </p:sp>
+      <p:pic>
+        <p:nvPicPr>
+          <p:cNvPr id="3" name="Picture 2">
+            <a:extLst>
+              <a:ext uri="{FF2B5EF4-FFF2-40B4-BE49-F238E27FC236}">
+                <a16:creationId xmlns:a16="http://schemas.microsoft.com/office/drawing/2014/main" id="{EA835E29-E181-4104-BB43-B1005553AB1A}"/>
+              </a:ext>
+            </a:extLst>
+          </p:cNvPr>
+          <p:cNvPicPr>
+            <a:picLocks noChangeAspect="1"/>
+          </p:cNvPicPr>
+          <p:nvPr/>
+        </p:nvPicPr>
+        <p:blipFill>
+          <a:blip r:embed="rId2"/>
+          <a:stretch>
+            <a:fillRect/>
+          </a:stretch>
+        </p:blipFill>
+        <p:spPr>
+          <a:xfrm>
+            <a:off x="765820" y="151663"/>
+            <a:ext cx="10755348" cy="6008452"/>
+          </a:xfrm>
+          <a:prstGeom prst="rect">
+            <a:avLst/>
+          </a:prstGeom>
+        </p:spPr>
+      </p:pic>
+    </p:spTree>
+    <p:extLst>
+      <p:ext uri="{BB962C8B-B14F-4D97-AF65-F5344CB8AC3E}">
+        <p14:creationId xmlns:p14="http://schemas.microsoft.com/office/powerpoint/2010/main" val="3277400508"/>
+      </p:ext>
+    </p:extLst>
+  </p:cSld>
+  <p:clrMapOvr>
+    <a:masterClrMapping/>
+  </p:clrMapOvr>
+  <mc:AlternateContent xmlns:mc="http://schemas.openxmlformats.org/markup-compatibility/2006" xmlns:p14="http://schemas.microsoft.com/office/powerpoint/2010/main">
+    <mc:Choice Requires="p14">
+      <p:transition spd="med" p14:dur="700">
+        <p:fade/>
+      </p:transition>
+    </mc:Choice>
+    <mc:Fallback xmlns="">
+      <p:transition spd="med">
+        <p:fade/>
+      </p:transition>
+    </mc:Fallback>
+  </mc:AlternateContent>
+  <p:timing>
+    <p:tnLst>
+      <p:par>
+        <p:cTn id="1" dur="indefinite" restart="never" nodeType="tmRoot">
+          <p:childTnLst>
+            <p:seq concurrent="1" nextAc="seek">
+              <p:cTn id="2" dur="indefinite" nodeType="mainSeq">
+                <p:childTnLst>
+                  <p:par>
+                    <p:cTn id="3" fill="hold">
+                      <p:stCondLst>
+                        <p:cond delay="indefinite"/>
+                        <p:cond evt="onBegin" delay="0">
+                          <p:tn val="2"/>
+                        </p:cond>
+                      </p:stCondLst>
+                      <p:childTnLst>
+                        <p:par>
+                          <p:cTn id="4" fill="hold">
+                            <p:stCondLst>
+                              <p:cond delay="0"/>
+                            </p:stCondLst>
+                            <p:childTnLst>
+                              <p:par>
+                                <p:cTn id="5" presetID="14" presetClass="entr" presetSubtype="10" fill="hold" nodeType="afterEffect">
+                                  <p:stCondLst>
+                                    <p:cond delay="0"/>
+                                  </p:stCondLst>
+                                  <p:childTnLst>
+                                    <p:set>
+                                      <p:cBhvr>
+                                        <p:cTn id="6" dur="1" fill="hold">
+                                          <p:stCondLst>
+                                            <p:cond delay="0"/>
+                                          </p:stCondLst>
+                                        </p:cTn>
+                                        <p:tgtEl>
+                                          <p:spTgt spid="3"/>
+                                        </p:tgtEl>
+                                        <p:attrNameLst>
+                                          <p:attrName>style.visibility</p:attrName>
+                                        </p:attrNameLst>
+                                      </p:cBhvr>
+                                      <p:to>
+                                        <p:strVal val="visible"/>
+                                      </p:to>
+                                    </p:set>
+                                    <p:animEffect transition="in" filter="randombar(horizontal)">
+                                      <p:cBhvr>
+                                        <p:cTn id="7" dur="500"/>
+                                        <p:tgtEl>
+                                          <p:spTgt spid="3"/>
+                                        </p:tgtEl>
+                                      </p:cBhvr>
+                                    </p:animEffect>
+                                  </p:childTnLst>
+                                </p:cTn>
+                              </p:par>
+                            </p:childTnLst>
+                          </p:cTn>
+                        </p:par>
+                      </p:childTnLst>
+                    </p:cTn>
+                  </p:par>
+                </p:childTnLst>
+              </p:cTn>
+              <p:prevCondLst>
+                <p:cond evt="onPrev" delay="0">
+                  <p:tgtEl>
+                    <p:sldTgt/>
+                  </p:tgtEl>
+                </p:cond>
+              </p:prevCondLst>
+              <p:nextCondLst>
+                <p:cond evt="onNext" delay="0">
+                  <p:tgtEl>
+                    <p:sldTgt/>
+                  </p:tgtEl>
+                </p:cond>
+              </p:nextCondLst>
+            </p:seq>
+          </p:childTnLst>
+        </p:cTn>
+      </p:par>
+    </p:tnLst>
+  </p:timing>
+</p:sld>
+</file>
+
+<file path=ppt/slides/slide9.xml><?xml version="1.0" encoding="utf-8"?>
 <p:sld xmlns:a="http://schemas.openxmlformats.org/drawingml/2006/main" xmlns:r="http://schemas.openxmlformats.org/officeDocument/2006/relationships" xmlns:p="http://schemas.openxmlformats.org/presentationml/2006/main">
   <p:cSld>
     <p:spTree>
@@ -7803,272 +8417,6 @@
         </p:cTn>
       </p:par>
     </p:tnLst>
-  </p:timing>
-</p:sld>
-</file>
-
-<file path=ppt/slides/slide9.xml><?xml version="1.0" encoding="utf-8"?>
-<p:sld xmlns:a="http://schemas.openxmlformats.org/drawingml/2006/main" xmlns:r="http://schemas.openxmlformats.org/officeDocument/2006/relationships" xmlns:p="http://schemas.openxmlformats.org/presentationml/2006/main">
-  <p:cSld>
-    <p:spTree>
-      <p:nvGrpSpPr>
-        <p:cNvPr id="1" name=""/>
-        <p:cNvGrpSpPr/>
-        <p:nvPr/>
-      </p:nvGrpSpPr>
-      <p:grpSpPr>
-        <a:xfrm>
-          <a:off x="0" y="0"/>
-          <a:ext cx="0" cy="0"/>
-          <a:chOff x="0" y="0"/>
-          <a:chExt cx="0" cy="0"/>
-        </a:xfrm>
-      </p:grpSpPr>
-      <p:sp>
-        <p:nvSpPr>
-          <p:cNvPr id="13" name="Title 12"/>
-          <p:cNvSpPr>
-            <a:spLocks noGrp="1"/>
-          </p:cNvSpPr>
-          <p:nvPr>
-            <p:ph type="title"/>
-          </p:nvPr>
-        </p:nvSpPr>
-        <p:spPr>
-          <a:xfrm>
-            <a:off x="680734" y="2777648"/>
-            <a:ext cx="10971372" cy="1066800"/>
-          </a:xfrm>
-        </p:spPr>
-        <p:txBody>
-          <a:bodyPr>
-            <a:normAutofit/>
-          </a:bodyPr>
-          <a:lstStyle/>
-          <a:p>
-            <a:pPr algn="ctr"/>
-            <a:r>
-              <a:rPr lang="en-US" sz="6600" b="1" dirty="0"/>
-              <a:t>Questions?</a:t>
-            </a:r>
-          </a:p>
-        </p:txBody>
-      </p:sp>
-      <p:sp>
-        <p:nvSpPr>
-          <p:cNvPr id="14" name="Content Placeholder 13"/>
-          <p:cNvSpPr>
-            <a:spLocks noGrp="1"/>
-          </p:cNvSpPr>
-          <p:nvPr>
-            <p:ph idx="1"/>
-          </p:nvPr>
-        </p:nvSpPr>
-        <p:spPr>
-          <a:xfrm>
-            <a:off x="1293813" y="685800"/>
-            <a:ext cx="4872607" cy="4190999"/>
-          </a:xfrm>
-        </p:spPr>
-        <p:txBody>
-          <a:bodyPr>
-            <a:normAutofit/>
-          </a:bodyPr>
-          <a:lstStyle/>
-          <a:p>
-            <a:pPr marL="0" indent="0" algn="just">
-              <a:buNone/>
-            </a:pPr>
-            <a:endParaRPr lang="en-CA" dirty="0"/>
-          </a:p>
-          <a:p>
-            <a:pPr algn="just">
-              <a:buFont typeface="Wingdings" panose="05000000000000000000" pitchFamily="2" charset="2"/>
-              <a:buChar char="q"/>
-            </a:pPr>
-            <a:endParaRPr lang="en-CA" dirty="0"/>
-          </a:p>
-        </p:txBody>
-      </p:sp>
-    </p:spTree>
-    <p:extLst>
-      <p:ext uri="{BB962C8B-B14F-4D97-AF65-F5344CB8AC3E}">
-        <p14:creationId xmlns:p14="http://schemas.microsoft.com/office/powerpoint/2010/main" val="302370877"/>
-      </p:ext>
-    </p:extLst>
-  </p:cSld>
-  <p:clrMapOvr>
-    <a:masterClrMapping/>
-  </p:clrMapOvr>
-  <mc:AlternateContent xmlns:mc="http://schemas.openxmlformats.org/markup-compatibility/2006" xmlns:p14="http://schemas.microsoft.com/office/powerpoint/2010/main">
-    <mc:Choice Requires="p14">
-      <p:transition spd="med" p14:dur="700">
-        <p:fade/>
-      </p:transition>
-    </mc:Choice>
-    <mc:Fallback xmlns="">
-      <p:transition spd="med">
-        <p:fade/>
-      </p:transition>
-    </mc:Fallback>
-  </mc:AlternateContent>
-  <p:timing>
-    <p:tnLst>
-      <p:par>
-        <p:cTn id="1" dur="indefinite" restart="never" nodeType="tmRoot">
-          <p:childTnLst>
-            <p:seq concurrent="1" nextAc="seek">
-              <p:cTn id="2" dur="indefinite" nodeType="mainSeq">
-                <p:childTnLst>
-                  <p:par>
-                    <p:cTn id="3" fill="hold">
-                      <p:stCondLst>
-                        <p:cond delay="indefinite"/>
-                        <p:cond evt="onBegin" delay="0">
-                          <p:tn val="2"/>
-                        </p:cond>
-                      </p:stCondLst>
-                      <p:childTnLst>
-                        <p:par>
-                          <p:cTn id="4" fill="hold">
-                            <p:stCondLst>
-                              <p:cond delay="0"/>
-                            </p:stCondLst>
-                            <p:childTnLst>
-                              <p:par>
-                                <p:cTn id="5" presetID="31" presetClass="entr" presetSubtype="0" fill="hold" grpId="0" nodeType="afterEffect">
-                                  <p:stCondLst>
-                                    <p:cond delay="0"/>
-                                  </p:stCondLst>
-                                  <p:childTnLst>
-                                    <p:set>
-                                      <p:cBhvr>
-                                        <p:cTn id="6" dur="1" fill="hold">
-                                          <p:stCondLst>
-                                            <p:cond delay="0"/>
-                                          </p:stCondLst>
-                                        </p:cTn>
-                                        <p:tgtEl>
-                                          <p:spTgt spid="13"/>
-                                        </p:tgtEl>
-                                        <p:attrNameLst>
-                                          <p:attrName>style.visibility</p:attrName>
-                                        </p:attrNameLst>
-                                      </p:cBhvr>
-                                      <p:to>
-                                        <p:strVal val="visible"/>
-                                      </p:to>
-                                    </p:set>
-                                    <p:anim calcmode="lin" valueType="num">
-                                      <p:cBhvr>
-                                        <p:cTn id="7" dur="1000" fill="hold"/>
-                                        <p:tgtEl>
-                                          <p:spTgt spid="13"/>
-                                        </p:tgtEl>
-                                        <p:attrNameLst>
-                                          <p:attrName>ppt_w</p:attrName>
-                                        </p:attrNameLst>
-                                      </p:cBhvr>
-                                      <p:tavLst>
-                                        <p:tav tm="0">
-                                          <p:val>
-                                            <p:fltVal val="0"/>
-                                          </p:val>
-                                        </p:tav>
-                                        <p:tav tm="100000">
-                                          <p:val>
-                                            <p:strVal val="#ppt_w"/>
-                                          </p:val>
-                                        </p:tav>
-                                      </p:tavLst>
-                                    </p:anim>
-                                    <p:anim calcmode="lin" valueType="num">
-                                      <p:cBhvr>
-                                        <p:cTn id="8" dur="1000" fill="hold"/>
-                                        <p:tgtEl>
-                                          <p:spTgt spid="13"/>
-                                        </p:tgtEl>
-                                        <p:attrNameLst>
-                                          <p:attrName>ppt_h</p:attrName>
-                                        </p:attrNameLst>
-                                      </p:cBhvr>
-                                      <p:tavLst>
-                                        <p:tav tm="0">
-                                          <p:val>
-                                            <p:fltVal val="0"/>
-                                          </p:val>
-                                        </p:tav>
-                                        <p:tav tm="100000">
-                                          <p:val>
-                                            <p:strVal val="#ppt_h"/>
-                                          </p:val>
-                                        </p:tav>
-                                      </p:tavLst>
-                                    </p:anim>
-                                    <p:anim calcmode="lin" valueType="num">
-                                      <p:cBhvr>
-                                        <p:cTn id="9" dur="1000" fill="hold"/>
-                                        <p:tgtEl>
-                                          <p:spTgt spid="13"/>
-                                        </p:tgtEl>
-                                        <p:attrNameLst>
-                                          <p:attrName>style.rotation</p:attrName>
-                                        </p:attrNameLst>
-                                      </p:cBhvr>
-                                      <p:tavLst>
-                                        <p:tav tm="0">
-                                          <p:val>
-                                            <p:fltVal val="90"/>
-                                          </p:val>
-                                        </p:tav>
-                                        <p:tav tm="100000">
-                                          <p:val>
-                                            <p:fltVal val="0"/>
-                                          </p:val>
-                                        </p:tav>
-                                      </p:tavLst>
-                                    </p:anim>
-                                    <p:animEffect transition="in" filter="fade">
-                                      <p:cBhvr>
-                                        <p:cTn id="10" dur="1000"/>
-                                        <p:tgtEl>
-                                          <p:spTgt spid="13"/>
-                                        </p:tgtEl>
-                                      </p:cBhvr>
-                                    </p:animEffect>
-                                  </p:childTnLst>
-                                </p:cTn>
-                              </p:par>
-                            </p:childTnLst>
-                          </p:cTn>
-                        </p:par>
-                      </p:childTnLst>
-                    </p:cTn>
-                  </p:par>
-                </p:childTnLst>
-              </p:cTn>
-              <p:prevCondLst>
-                <p:cond evt="onPrev" delay="0">
-                  <p:tgtEl>
-                    <p:sldTgt/>
-                  </p:tgtEl>
-                </p:cond>
-              </p:prevCondLst>
-              <p:nextCondLst>
-                <p:cond evt="onNext" delay="0">
-                  <p:tgtEl>
-                    <p:sldTgt/>
-                  </p:tgtEl>
-                </p:cond>
-              </p:nextCondLst>
-            </p:seq>
-          </p:childTnLst>
-        </p:cTn>
-      </p:par>
-    </p:tnLst>
-    <p:bldLst>
-      <p:bldP spid="13" grpId="0"/>
-    </p:bldLst>
   </p:timing>
 </p:sld>
 </file>

</xml_diff>